<commit_message>
Tidy up the course material
</commit_message>
<xml_diff>
--- a/1_Significance_Correlation.pptx
+++ b/1_Significance_Correlation.pptx
@@ -5,17 +5,18 @@
     <p:sldMasterId id="2147484703" r:id="rId1"/>
   </p:sldMasterIdLst>
   <p:notesMasterIdLst>
-    <p:notesMasterId r:id="rId7"/>
+    <p:notesMasterId r:id="rId8"/>
   </p:notesMasterIdLst>
   <p:handoutMasterIdLst>
-    <p:handoutMasterId r:id="rId8"/>
+    <p:handoutMasterId r:id="rId9"/>
   </p:handoutMasterIdLst>
   <p:sldIdLst>
     <p:sldId id="352" r:id="rId2"/>
     <p:sldId id="300" r:id="rId3"/>
     <p:sldId id="342" r:id="rId4"/>
     <p:sldId id="316" r:id="rId5"/>
-    <p:sldId id="343" r:id="rId6"/>
+    <p:sldId id="367" r:id="rId6"/>
+    <p:sldId id="366" r:id="rId7"/>
   </p:sldIdLst>
   <p:sldSz cx="12192000" cy="6858000"/>
   <p:notesSz cx="6858000" cy="9144000"/>
@@ -218,7 +219,7 @@
           <a:p>
             <a:fld id="{73D5C047-4BF6-2244-A5E3-D41B1218D9A5}" type="datetimeFigureOut">
               <a:rPr lang="en-GB" smtClean="0"/>
-              <a:t>15/08/2024</a:t>
+              <a:t>21/08/2024</a:t>
             </a:fld>
             <a:endParaRPr lang="en-GB"/>
           </a:p>
@@ -383,7 +384,7 @@
           <a:p>
             <a:fld id="{8A376A05-844D-A64C-9434-FF3712A59FB6}" type="datetimeFigureOut">
               <a:rPr lang="en-GB" smtClean="0"/>
-              <a:t>15/08/2024</a:t>
+              <a:t>21/08/2024</a:t>
             </a:fld>
             <a:endParaRPr lang="en-GB"/>
           </a:p>
@@ -1312,32 +1313,7 @@
           <a:bodyPr/>
           <a:lstStyle/>
           <a:p>
-            <a:pPr marL="0" marR="0" lvl="0" indent="0" algn="l" defTabSz="914400" rtl="0" eaLnBrk="1" fontAlgn="auto" latinLnBrk="0" hangingPunct="1">
-              <a:lnSpc>
-                <a:spcPct val="100000"/>
-              </a:lnSpc>
-              <a:spcBef>
-                <a:spcPts val="0"/>
-              </a:spcBef>
-              <a:spcAft>
-                <a:spcPts val="0"/>
-              </a:spcAft>
-              <a:buClrTx/>
-              <a:buSzTx/>
-              <a:buFontTx/>
-              <a:buNone/>
-              <a:tabLst/>
-              <a:defRPr/>
-            </a:pPr>
-            <a:endParaRPr lang="en-SG" sz="1200" b="0" i="0" u="none" strike="noStrike" kern="1200" dirty="0">
-              <a:solidFill>
-                <a:schemeClr val="tx1"/>
-              </a:solidFill>
-              <a:effectLst/>
-              <a:latin typeface="+mn-lt"/>
-              <a:ea typeface="+mn-ea"/>
-              <a:cs typeface="+mn-cs"/>
-            </a:endParaRPr>
+            <a:endParaRPr lang="en-GB" dirty="0"/>
           </a:p>
         </p:txBody>
       </p:sp>
@@ -1367,7 +1343,91 @@
     </p:spTree>
     <p:extLst>
       <p:ext uri="{BB962C8B-B14F-4D97-AF65-F5344CB8AC3E}">
-        <p14:creationId xmlns:p14="http://schemas.microsoft.com/office/powerpoint/2010/main" val="3080175704"/>
+        <p14:creationId xmlns:p14="http://schemas.microsoft.com/office/powerpoint/2010/main" val="1819787041"/>
+      </p:ext>
+    </p:extLst>
+  </p:cSld>
+  <p:clrMapOvr>
+    <a:masterClrMapping/>
+  </p:clrMapOvr>
+</p:notes>
+</file>
+
+<file path=ppt/notesSlides/notesSlide6.xml><?xml version="1.0" encoding="utf-8"?>
+<p:notes xmlns:a="http://schemas.openxmlformats.org/drawingml/2006/main" xmlns:r="http://schemas.openxmlformats.org/officeDocument/2006/relationships" xmlns:p="http://schemas.openxmlformats.org/presentationml/2006/main">
+  <p:cSld>
+    <p:spTree>
+      <p:nvGrpSpPr>
+        <p:cNvPr id="1" name=""/>
+        <p:cNvGrpSpPr/>
+        <p:nvPr/>
+      </p:nvGrpSpPr>
+      <p:grpSpPr>
+        <a:xfrm>
+          <a:off x="0" y="0"/>
+          <a:ext cx="0" cy="0"/>
+          <a:chOff x="0" y="0"/>
+          <a:chExt cx="0" cy="0"/>
+        </a:xfrm>
+      </p:grpSpPr>
+      <p:sp>
+        <p:nvSpPr>
+          <p:cNvPr id="2" name="Slide Image Placeholder 1"/>
+          <p:cNvSpPr>
+            <a:spLocks noGrp="1" noRot="1" noChangeAspect="1"/>
+          </p:cNvSpPr>
+          <p:nvPr>
+            <p:ph type="sldImg"/>
+          </p:nvPr>
+        </p:nvSpPr>
+        <p:spPr/>
+      </p:sp>
+      <p:sp>
+        <p:nvSpPr>
+          <p:cNvPr id="3" name="Notes Placeholder 2"/>
+          <p:cNvSpPr>
+            <a:spLocks noGrp="1"/>
+          </p:cNvSpPr>
+          <p:nvPr>
+            <p:ph type="body" idx="1"/>
+          </p:nvPr>
+        </p:nvSpPr>
+        <p:spPr/>
+        <p:txBody>
+          <a:bodyPr/>
+          <a:lstStyle/>
+          <a:p>
+            <a:endParaRPr lang="en-GB" dirty="0"/>
+          </a:p>
+        </p:txBody>
+      </p:sp>
+      <p:sp>
+        <p:nvSpPr>
+          <p:cNvPr id="4" name="Slide Number Placeholder 3"/>
+          <p:cNvSpPr>
+            <a:spLocks noGrp="1"/>
+          </p:cNvSpPr>
+          <p:nvPr>
+            <p:ph type="sldNum" sz="quarter" idx="5"/>
+          </p:nvPr>
+        </p:nvSpPr>
+        <p:spPr/>
+        <p:txBody>
+          <a:bodyPr/>
+          <a:lstStyle/>
+          <a:p>
+            <a:fld id="{00852781-589E-1342-9FF2-F49B87B49D0B}" type="slidenum">
+              <a:rPr lang="en-GB" smtClean="0"/>
+              <a:t>6</a:t>
+            </a:fld>
+            <a:endParaRPr lang="en-GB"/>
+          </a:p>
+        </p:txBody>
+      </p:sp>
+    </p:spTree>
+    <p:extLst>
+      <p:ext uri="{BB962C8B-B14F-4D97-AF65-F5344CB8AC3E}">
+        <p14:creationId xmlns:p14="http://schemas.microsoft.com/office/powerpoint/2010/main" val="2985429439"/>
       </p:ext>
     </p:extLst>
   </p:cSld>
@@ -10170,7 +10230,7 @@
           <a:p>
             <a:fld id="{5D8171C0-695E-BD4E-B021-8976B44C063A}" type="datetime1">
               <a:rPr lang="en-SG" smtClean="0"/>
-              <a:t>15/8/24</a:t>
+              <a:t>21/8/24</a:t>
             </a:fld>
             <a:endParaRPr lang="en-GB"/>
           </a:p>
@@ -10377,7 +10437,7 @@
           <a:p>
             <a:fld id="{6F853C54-8EB9-C24B-9C31-2B1DDC9DE9A6}" type="datetime1">
               <a:rPr lang="en-SG" smtClean="0"/>
-              <a:t>15/8/24</a:t>
+              <a:t>21/8/24</a:t>
             </a:fld>
             <a:endParaRPr lang="en-GB"/>
           </a:p>
@@ -10552,7 +10612,7 @@
           <a:p>
             <a:fld id="{3472FA3B-614A-7B44-98FC-38DCC6EB32F4}" type="datetime1">
               <a:rPr lang="en-SG" smtClean="0"/>
-              <a:t>15/8/24</a:t>
+              <a:t>21/8/24</a:t>
             </a:fld>
             <a:endParaRPr lang="en-GB"/>
           </a:p>
@@ -10786,7 +10846,7 @@
           <a:p>
             <a:fld id="{159A31D3-5D48-6C49-8100-1BFEDDA27045}" type="datetime1">
               <a:rPr lang="en-SG" smtClean="0"/>
-              <a:t>15/8/24</a:t>
+              <a:t>21/8/24</a:t>
             </a:fld>
             <a:endParaRPr lang="en-GB"/>
           </a:p>
@@ -19691,7 +19751,7 @@
           <a:p>
             <a:fld id="{33FB4DE5-3FA5-CB41-9D0A-192659D1CB71}" type="datetime1">
               <a:rPr lang="en-SG" smtClean="0"/>
-              <a:t>15/8/24</a:t>
+              <a:t>21/8/24</a:t>
             </a:fld>
             <a:endParaRPr lang="en-GB"/>
           </a:p>
@@ -19964,7 +20024,7 @@
           <a:p>
             <a:fld id="{2BA4E459-705C-6E47-A7D6-9BAC4DCC79E5}" type="datetime1">
               <a:rPr lang="en-SG" smtClean="0"/>
-              <a:t>15/8/24</a:t>
+              <a:t>21/8/24</a:t>
             </a:fld>
             <a:endParaRPr lang="en-GB"/>
           </a:p>
@@ -20362,7 +20422,7 @@
           <a:p>
             <a:fld id="{7A41D9F5-A799-534F-ADC1-59DEE366892C}" type="datetime1">
               <a:rPr lang="en-SG" smtClean="0"/>
-              <a:t>15/8/24</a:t>
+              <a:t>21/8/24</a:t>
             </a:fld>
             <a:endParaRPr lang="en-GB"/>
           </a:p>
@@ -20480,7 +20540,7 @@
           <a:p>
             <a:fld id="{65CD0D58-1596-D242-A555-BB899CD37BDE}" type="datetime1">
               <a:rPr lang="en-SG" smtClean="0"/>
-              <a:t>15/8/24</a:t>
+              <a:t>21/8/24</a:t>
             </a:fld>
             <a:endParaRPr lang="en-GB"/>
           </a:p>
@@ -20570,7 +20630,7 @@
           <a:p>
             <a:fld id="{C6195D21-BC09-2042-8183-6DEFCDF5312A}" type="datetime1">
               <a:rPr lang="en-SG" smtClean="0"/>
-              <a:t>15/8/24</a:t>
+              <a:t>21/8/24</a:t>
             </a:fld>
             <a:endParaRPr lang="en-GB"/>
           </a:p>
@@ -20860,7 +20920,7 @@
           <a:p>
             <a:fld id="{96BFDC18-B983-004C-8152-2C2BF2CFEDD7}" type="datetime1">
               <a:rPr lang="en-SG" smtClean="0"/>
-              <a:t>15/8/24</a:t>
+              <a:t>21/8/24</a:t>
             </a:fld>
             <a:endParaRPr lang="en-GB"/>
           </a:p>
@@ -21140,7 +21200,7 @@
           <a:p>
             <a:fld id="{2B69BD44-7826-F548-A836-9F6150569590}" type="datetime1">
               <a:rPr lang="en-SG" smtClean="0"/>
-              <a:t>15/8/24</a:t>
+              <a:t>21/8/24</a:t>
             </a:fld>
             <a:endParaRPr lang="en-GB"/>
           </a:p>
@@ -21508,7 +21568,7 @@
           <a:p>
             <a:fld id="{2DC3BF20-5808-0847-A21A-F2A835930045}" type="datetime1">
               <a:rPr lang="en-SG" smtClean="0"/>
-              <a:t>15/8/24</a:t>
+              <a:t>21/8/24</a:t>
             </a:fld>
             <a:endParaRPr lang="en-GB"/>
           </a:p>
@@ -23598,6 +23658,170 @@
       </p:grpSpPr>
       <p:sp>
         <p:nvSpPr>
+          <p:cNvPr id="2" name="Title 1">
+            <a:extLst>
+              <a:ext uri="{FF2B5EF4-FFF2-40B4-BE49-F238E27FC236}">
+                <a16:creationId xmlns:a16="http://schemas.microsoft.com/office/drawing/2014/main" id="{67D32647-30F0-3B45-868F-FBC0B1734A50}"/>
+              </a:ext>
+            </a:extLst>
+          </p:cNvPr>
+          <p:cNvSpPr>
+            <a:spLocks noGrp="1"/>
+          </p:cNvSpPr>
+          <p:nvPr>
+            <p:ph type="title"/>
+          </p:nvPr>
+        </p:nvSpPr>
+        <p:spPr>
+          <a:xfrm>
+            <a:off x="1024127" y="402336"/>
+            <a:ext cx="10140401" cy="1219987"/>
+          </a:xfrm>
+        </p:spPr>
+        <p:txBody>
+          <a:bodyPr>
+            <a:normAutofit/>
+          </a:bodyPr>
+          <a:lstStyle/>
+          <a:p>
+            <a:r>
+              <a:rPr lang="en-GB" sz="3600" dirty="0"/>
+              <a:t>Multiple testing – </a:t>
+            </a:r>
+            <a:r>
+              <a:rPr lang="en-GB" sz="3600" dirty="0" err="1"/>
+              <a:t>Benjamini</a:t>
+            </a:r>
+            <a:r>
+              <a:rPr lang="en-GB" sz="3600" dirty="0"/>
+              <a:t>-Hochberg method</a:t>
+            </a:r>
+            <a:endParaRPr lang="en-GB" sz="3600" cap="none" dirty="0">
+              <a:latin typeface="+mn-lt"/>
+            </a:endParaRPr>
+          </a:p>
+        </p:txBody>
+      </p:sp>
+      <p:sp>
+        <p:nvSpPr>
+          <p:cNvPr id="4" name="Content Placeholder 3">
+            <a:extLst>
+              <a:ext uri="{FF2B5EF4-FFF2-40B4-BE49-F238E27FC236}">
+                <a16:creationId xmlns:a16="http://schemas.microsoft.com/office/drawing/2014/main" id="{5F0F6D09-21D1-B445-A0D3-811B8173FDA9}"/>
+              </a:ext>
+            </a:extLst>
+          </p:cNvPr>
+          <p:cNvSpPr>
+            <a:spLocks noGrp="1"/>
+          </p:cNvSpPr>
+          <p:nvPr>
+            <p:ph idx="1"/>
+          </p:nvPr>
+        </p:nvSpPr>
+        <p:spPr>
+          <a:xfrm>
+            <a:off x="1024129" y="1873045"/>
+            <a:ext cx="10140399" cy="4984955"/>
+          </a:xfrm>
+        </p:spPr>
+        <p:txBody>
+          <a:bodyPr>
+            <a:normAutofit/>
+          </a:bodyPr>
+          <a:lstStyle/>
+          <a:p>
+            <a:pPr marL="0" indent="0">
+              <a:buNone/>
+            </a:pPr>
+            <a:r>
+              <a:rPr lang="en-GB" sz="2400" dirty="0"/>
+              <a:t>For given </a:t>
+            </a:r>
+            <a:r>
+              <a:rPr lang="el-GR" sz="2400" dirty="0"/>
+              <a:t>α</a:t>
+            </a:r>
+            <a:r>
+              <a:rPr lang="en-GB" sz="2400" dirty="0"/>
+              <a:t> let k find the largest k such that P</a:t>
+            </a:r>
+            <a:r>
+              <a:rPr lang="en-GB" sz="2400" baseline="-25000" dirty="0"/>
+              <a:t>(k)</a:t>
+            </a:r>
+            <a:r>
+              <a:rPr lang="en-GB" sz="2400" dirty="0"/>
+              <a:t> ≤ (k/m)</a:t>
+            </a:r>
+            <a:r>
+              <a:rPr lang="el-GR" sz="2400" dirty="0"/>
+              <a:t> α</a:t>
+            </a:r>
+            <a:endParaRPr lang="en-GB" sz="2400" dirty="0"/>
+          </a:p>
+          <a:p>
+            <a:pPr marL="0" indent="0">
+              <a:buNone/>
+            </a:pPr>
+            <a:r>
+              <a:rPr lang="en-GB" sz="2400" dirty="0"/>
+              <a:t>and reject null hypothesis H</a:t>
+            </a:r>
+            <a:r>
+              <a:rPr lang="en-GB" sz="2400" baseline="-25000" dirty="0"/>
+              <a:t>i</a:t>
+            </a:r>
+            <a:r>
+              <a:rPr lang="en-GB" sz="2400" dirty="0"/>
+              <a:t> for </a:t>
+            </a:r>
+            <a:r>
+              <a:rPr lang="en-GB" sz="2400" dirty="0" err="1"/>
+              <a:t>i</a:t>
+            </a:r>
+            <a:r>
+              <a:rPr lang="en-GB" sz="2400" dirty="0"/>
+              <a:t>=1,..,k</a:t>
+            </a:r>
+          </a:p>
+          <a:p>
+            <a:pPr marL="811842" lvl="1" indent="-541338">
+              <a:lnSpc>
+                <a:spcPct val="150000"/>
+              </a:lnSpc>
+              <a:buFont typeface="Wingdings" pitchFamily="2" charset="2"/>
+              <a:buChar char="v"/>
+            </a:pPr>
+            <a:endParaRPr lang="en-GB" sz="1600" dirty="0">
+              <a:latin typeface="Menlo" panose="020B0609030804020204" pitchFamily="49" charset="0"/>
+              <a:ea typeface="Menlo" panose="020B0609030804020204" pitchFamily="49" charset="0"/>
+              <a:cs typeface="Menlo" panose="020B0609030804020204" pitchFamily="49" charset="0"/>
+            </a:endParaRPr>
+          </a:p>
+          <a:p>
+            <a:pPr marL="811842" lvl="1" indent="-541338">
+              <a:lnSpc>
+                <a:spcPct val="150000"/>
+              </a:lnSpc>
+              <a:buFont typeface="Wingdings" pitchFamily="2" charset="2"/>
+              <a:buChar char="v"/>
+            </a:pPr>
+            <a:endParaRPr lang="en-GB" sz="2200" dirty="0"/>
+          </a:p>
+          <a:p>
+            <a:pPr marL="811842" lvl="1" indent="-541338">
+              <a:lnSpc>
+                <a:spcPct val="150000"/>
+              </a:lnSpc>
+              <a:buFont typeface="Wingdings" pitchFamily="2" charset="2"/>
+              <a:buChar char="v"/>
+            </a:pPr>
+            <a:endParaRPr lang="en-GB" sz="2200" dirty="0"/>
+          </a:p>
+        </p:txBody>
+      </p:sp>
+      <p:sp>
+        <p:nvSpPr>
           <p:cNvPr id="3" name="Slide Number Placeholder 2">
             <a:extLst>
               <a:ext uri="{FF2B5EF4-FFF2-40B4-BE49-F238E27FC236}">
@@ -23628,7 +23852,333 @@
     </p:spTree>
     <p:extLst>
       <p:ext uri="{BB962C8B-B14F-4D97-AF65-F5344CB8AC3E}">
-        <p14:creationId xmlns:p14="http://schemas.microsoft.com/office/powerpoint/2010/main" val="534040475"/>
+        <p14:creationId xmlns:p14="http://schemas.microsoft.com/office/powerpoint/2010/main" val="2650360599"/>
+      </p:ext>
+    </p:extLst>
+  </p:cSld>
+  <p:clrMapOvr>
+    <a:masterClrMapping/>
+  </p:clrMapOvr>
+</p:sld>
+</file>
+
+<file path=ppt/slides/slide6.xml><?xml version="1.0" encoding="utf-8"?>
+<p:sld xmlns:a="http://schemas.openxmlformats.org/drawingml/2006/main" xmlns:r="http://schemas.openxmlformats.org/officeDocument/2006/relationships" xmlns:p="http://schemas.openxmlformats.org/presentationml/2006/main">
+  <p:cSld>
+    <p:spTree>
+      <p:nvGrpSpPr>
+        <p:cNvPr id="1" name=""/>
+        <p:cNvGrpSpPr/>
+        <p:nvPr/>
+      </p:nvGrpSpPr>
+      <p:grpSpPr>
+        <a:xfrm>
+          <a:off x="0" y="0"/>
+          <a:ext cx="0" cy="0"/>
+          <a:chOff x="0" y="0"/>
+          <a:chExt cx="0" cy="0"/>
+        </a:xfrm>
+      </p:grpSpPr>
+      <p:sp>
+        <p:nvSpPr>
+          <p:cNvPr id="2" name="Title 1">
+            <a:extLst>
+              <a:ext uri="{FF2B5EF4-FFF2-40B4-BE49-F238E27FC236}">
+                <a16:creationId xmlns:a16="http://schemas.microsoft.com/office/drawing/2014/main" id="{67D32647-30F0-3B45-868F-FBC0B1734A50}"/>
+              </a:ext>
+            </a:extLst>
+          </p:cNvPr>
+          <p:cNvSpPr>
+            <a:spLocks noGrp="1"/>
+          </p:cNvSpPr>
+          <p:nvPr>
+            <p:ph type="title"/>
+          </p:nvPr>
+        </p:nvSpPr>
+        <p:spPr>
+          <a:xfrm>
+            <a:off x="1024127" y="402336"/>
+            <a:ext cx="10140401" cy="1219987"/>
+          </a:xfrm>
+        </p:spPr>
+        <p:txBody>
+          <a:bodyPr>
+            <a:normAutofit/>
+          </a:bodyPr>
+          <a:lstStyle/>
+          <a:p>
+            <a:r>
+              <a:rPr lang="en-GB" sz="3600" dirty="0"/>
+              <a:t>Multiple testing – Bonferroni-holm method</a:t>
+            </a:r>
+            <a:endParaRPr lang="en-GB" sz="3600" cap="none" dirty="0">
+              <a:latin typeface="+mn-lt"/>
+            </a:endParaRPr>
+          </a:p>
+        </p:txBody>
+      </p:sp>
+      <p:sp>
+        <p:nvSpPr>
+          <p:cNvPr id="4" name="Content Placeholder 3">
+            <a:extLst>
+              <a:ext uri="{FF2B5EF4-FFF2-40B4-BE49-F238E27FC236}">
+                <a16:creationId xmlns:a16="http://schemas.microsoft.com/office/drawing/2014/main" id="{5F0F6D09-21D1-B445-A0D3-811B8173FDA9}"/>
+              </a:ext>
+            </a:extLst>
+          </p:cNvPr>
+          <p:cNvSpPr>
+            <a:spLocks noGrp="1"/>
+          </p:cNvSpPr>
+          <p:nvPr>
+            <p:ph idx="1"/>
+          </p:nvPr>
+        </p:nvSpPr>
+        <p:spPr>
+          <a:xfrm>
+            <a:off x="696934" y="1485749"/>
+            <a:ext cx="10140399" cy="4984955"/>
+          </a:xfrm>
+        </p:spPr>
+        <p:txBody>
+          <a:bodyPr>
+            <a:normAutofit/>
+          </a:bodyPr>
+          <a:lstStyle/>
+          <a:p>
+            <a:pPr marL="811842" lvl="1" indent="-541338">
+              <a:lnSpc>
+                <a:spcPct val="150000"/>
+              </a:lnSpc>
+              <a:buFont typeface="Wingdings" pitchFamily="2" charset="2"/>
+              <a:buChar char="v"/>
+            </a:pPr>
+            <a:endParaRPr lang="en-GB" sz="1600" dirty="0">
+              <a:latin typeface="Menlo" panose="020B0609030804020204" pitchFamily="49" charset="0"/>
+              <a:ea typeface="Menlo" panose="020B0609030804020204" pitchFamily="49" charset="0"/>
+              <a:cs typeface="Menlo" panose="020B0609030804020204" pitchFamily="49" charset="0"/>
+            </a:endParaRPr>
+          </a:p>
+          <a:p>
+            <a:pPr marL="270504" lvl="1" indent="0">
+              <a:lnSpc>
+                <a:spcPct val="150000"/>
+              </a:lnSpc>
+              <a:buNone/>
+            </a:pPr>
+            <a:r>
+              <a:rPr lang="en-GB" sz="2200" dirty="0"/>
+              <a:t>Suppose you have m p-values, sorted into order lowest-to-highest P</a:t>
+            </a:r>
+            <a:r>
+              <a:rPr lang="en-GB" sz="2200" baseline="-25000" dirty="0"/>
+              <a:t>1</a:t>
+            </a:r>
+            <a:r>
+              <a:rPr lang="en-GB" sz="2200" dirty="0"/>
+              <a:t> , … , P</a:t>
+            </a:r>
+            <a:r>
+              <a:rPr lang="en-GB" sz="2200" baseline="-25000" dirty="0"/>
+              <a:t>m</a:t>
+            </a:r>
+            <a:r>
+              <a:rPr lang="en-GB" sz="2200" dirty="0"/>
+              <a:t>, and their corresponding hypotheses H</a:t>
+            </a:r>
+            <a:r>
+              <a:rPr lang="en-GB" sz="2200" baseline="-25000" dirty="0"/>
+              <a:t>1</a:t>
+            </a:r>
+            <a:r>
+              <a:rPr lang="en-GB" sz="2200" dirty="0"/>
+              <a:t> , … , </a:t>
+            </a:r>
+            <a:r>
+              <a:rPr lang="en-GB" sz="2200" dirty="0" err="1"/>
+              <a:t>H</a:t>
+            </a:r>
+            <a:r>
+              <a:rPr lang="en-GB" sz="2200" baseline="-25000" dirty="0" err="1"/>
+              <a:t>m</a:t>
+            </a:r>
+            <a:r>
+              <a:rPr lang="en-GB" sz="2200" dirty="0"/>
+              <a:t> . </a:t>
+            </a:r>
+          </a:p>
+          <a:p>
+            <a:pPr marL="270504" lvl="1" indent="0">
+              <a:lnSpc>
+                <a:spcPct val="150000"/>
+              </a:lnSpc>
+              <a:buNone/>
+            </a:pPr>
+            <a:r>
+              <a:rPr lang="en-GB" sz="2200" dirty="0"/>
+              <a:t>Choose a significance level </a:t>
+            </a:r>
+            <a:r>
+              <a:rPr lang="el-GR" sz="2200" dirty="0"/>
+              <a:t>α</a:t>
+            </a:r>
+            <a:r>
+              <a:rPr lang="en-GB" sz="2200" dirty="0"/>
+              <a:t> (e.g. 0.05).</a:t>
+            </a:r>
+          </a:p>
+          <a:p>
+            <a:pPr marL="811842" lvl="1" indent="-541338">
+              <a:lnSpc>
+                <a:spcPct val="150000"/>
+              </a:lnSpc>
+              <a:buFont typeface="Wingdings" pitchFamily="2" charset="2"/>
+              <a:buChar char="v"/>
+            </a:pPr>
+            <a:r>
+              <a:rPr lang="en-GB" sz="2200" dirty="0"/>
+              <a:t>Is P</a:t>
+            </a:r>
+            <a:r>
+              <a:rPr lang="en-GB" sz="2200" baseline="-25000" dirty="0"/>
+              <a:t>1</a:t>
+            </a:r>
+            <a:r>
+              <a:rPr lang="en-GB" sz="2200" dirty="0"/>
+              <a:t> &lt; </a:t>
+            </a:r>
+            <a:r>
+              <a:rPr lang="el-GR" sz="2200" dirty="0"/>
+              <a:t>α / </a:t>
+            </a:r>
+            <a:r>
+              <a:rPr lang="en-GB" sz="2200" dirty="0"/>
+              <a:t>m  ?   If so, reject H</a:t>
+            </a:r>
+            <a:r>
+              <a:rPr lang="en-GB" sz="2200" baseline="-25000" dirty="0"/>
+              <a:t>1</a:t>
+            </a:r>
+            <a:r>
+              <a:rPr lang="en-GB" sz="2200" dirty="0"/>
+              <a:t> and continue to the next step, otherwise EXIT.</a:t>
+            </a:r>
+          </a:p>
+          <a:p>
+            <a:pPr marL="811842" lvl="1" indent="-541338">
+              <a:lnSpc>
+                <a:spcPct val="150000"/>
+              </a:lnSpc>
+              <a:buFont typeface="Wingdings" pitchFamily="2" charset="2"/>
+              <a:buChar char="v"/>
+            </a:pPr>
+            <a:r>
+              <a:rPr lang="en-GB" sz="2200" dirty="0"/>
+              <a:t>Is P</a:t>
+            </a:r>
+            <a:r>
+              <a:rPr lang="en-GB" sz="2200" baseline="-25000" dirty="0"/>
+              <a:t>2</a:t>
+            </a:r>
+            <a:r>
+              <a:rPr lang="en-GB" sz="2200" dirty="0"/>
+              <a:t> &lt; </a:t>
+            </a:r>
+            <a:r>
+              <a:rPr lang="el-GR" sz="2200" dirty="0"/>
+              <a:t>α / </a:t>
+            </a:r>
+            <a:r>
+              <a:rPr lang="en-GB" sz="2200" dirty="0"/>
+              <a:t>m-1 ? If so, reject H</a:t>
+            </a:r>
+            <a:r>
+              <a:rPr lang="en-GB" sz="2200" baseline="-25000" dirty="0"/>
+              <a:t>2</a:t>
+            </a:r>
+            <a:r>
+              <a:rPr lang="en-GB" sz="2200" dirty="0"/>
+              <a:t> and continue to the next step, otherwise EXIT.</a:t>
+            </a:r>
+          </a:p>
+          <a:p>
+            <a:pPr marL="270504" lvl="1" indent="0">
+              <a:lnSpc>
+                <a:spcPct val="150000"/>
+              </a:lnSpc>
+              <a:buNone/>
+            </a:pPr>
+            <a:r>
+              <a:rPr lang="en-GB" sz="2200" dirty="0"/>
+              <a:t>…</a:t>
+            </a:r>
+          </a:p>
+          <a:p>
+            <a:pPr marL="270504" lvl="1" indent="0">
+              <a:lnSpc>
+                <a:spcPct val="150000"/>
+              </a:lnSpc>
+              <a:buNone/>
+            </a:pPr>
+            <a:r>
+              <a:rPr lang="en-GB" sz="2200" dirty="0"/>
+              <a:t>And so on: for each P value, test whether </a:t>
+            </a:r>
+            <a:r>
+              <a:rPr lang="en-GB" sz="2200" dirty="0" err="1"/>
+              <a:t>P</a:t>
+            </a:r>
+            <a:r>
+              <a:rPr lang="en-GB" sz="2200" baseline="-25000" dirty="0" err="1"/>
+              <a:t>k</a:t>
+            </a:r>
+            <a:r>
+              <a:rPr lang="en-GB" sz="2200" dirty="0"/>
+              <a:t> &lt; </a:t>
+            </a:r>
+            <a:r>
+              <a:rPr lang="el-GR" sz="2200" dirty="0"/>
+              <a:t>α </a:t>
+            </a:r>
+            <a:r>
+              <a:rPr lang="en-GB" sz="2200" dirty="0"/>
+              <a:t>/ m + 1 − k</a:t>
+            </a:r>
+          </a:p>
+        </p:txBody>
+      </p:sp>
+      <p:sp>
+        <p:nvSpPr>
+          <p:cNvPr id="3" name="Slide Number Placeholder 2">
+            <a:extLst>
+              <a:ext uri="{FF2B5EF4-FFF2-40B4-BE49-F238E27FC236}">
+                <a16:creationId xmlns:a16="http://schemas.microsoft.com/office/drawing/2014/main" id="{C6E5CD97-EBA1-B146-AC2F-3BBCE1ADE91D}"/>
+              </a:ext>
+            </a:extLst>
+          </p:cNvPr>
+          <p:cNvSpPr>
+            <a:spLocks noGrp="1"/>
+          </p:cNvSpPr>
+          <p:nvPr>
+            <p:ph type="sldNum" sz="quarter" idx="12"/>
+          </p:nvPr>
+        </p:nvSpPr>
+        <p:spPr/>
+        <p:txBody>
+          <a:bodyPr/>
+          <a:lstStyle/>
+          <a:p>
+            <a:fld id="{9F3C1A03-04C2-0846-ADDA-213E9916F0D3}" type="slidenum">
+              <a:rPr lang="en-GB" smtClean="0"/>
+              <a:t>6</a:t>
+            </a:fld>
+            <a:endParaRPr lang="en-GB"/>
+          </a:p>
+        </p:txBody>
+      </p:sp>
+    </p:spTree>
+    <p:extLst>
+      <p:ext uri="{BB962C8B-B14F-4D97-AF65-F5344CB8AC3E}">
+        <p14:creationId xmlns:p14="http://schemas.microsoft.com/office/powerpoint/2010/main" val="2601951424"/>
       </p:ext>
     </p:extLst>
   </p:cSld>

</xml_diff>